<commit_message>
refactoring du dossier d'exploitation
</commit_message>
<xml_diff>
--- a/Projet 8_Documentez votre système de gestion de pizzeria.pptx
+++ b/Projet 8_Documentez votre système de gestion de pizzeria.pptx
@@ -10775,27 +10775,7 @@
           <a:p>
             <a:r>
               <a:rPr lang="fr-FR" dirty="0" smtClean="0"/>
-              <a:t>Ce projet a vraiment été intéressant pour moi sur beaucoup de points. Il m’a permis de comprendre l’intérêt du document d’exploitation à savoir l’environnement nécessaire pour le déploiement et le lancement de l’application ainsi que la maintenance, sauvegarde et restauration. Le tout permettant le bon fonctionnement de l’application. Sans oublié que pour en venir à ce stade les </a:t>
-            </a:r>
-            <a:r>
-              <a:rPr lang="fr-FR" dirty="0" smtClean="0"/>
-              <a:t>document </a:t>
-            </a:r>
-            <a:r>
-              <a:rPr lang="fr-FR" dirty="0" smtClean="0"/>
-              <a:t>fonctionnelle et document de conception technique sont indispensables car ils sont les </a:t>
-            </a:r>
-            <a:r>
-              <a:rPr lang="fr-FR" dirty="0" err="1" smtClean="0"/>
-              <a:t>préquels</a:t>
-            </a:r>
-            <a:r>
-              <a:rPr lang="fr-FR" dirty="0" smtClean="0"/>
-              <a:t> </a:t>
-            </a:r>
-            <a:r>
-              <a:rPr lang="fr-FR" dirty="0" smtClean="0"/>
-              <a:t>de l’implémentation de l’application.</a:t>
+              <a:t>Ce projet a vraiment été intéressant pour moi sur beaucoup de points. Il m’a permis de comprendre l’intérêt du document d’exploitation à savoir l’environnement nécessaire pour le déploiement et le lancement de l’application ainsi que la maintenance, sauvegarde et restauration. Le tout permettant le bon fonctionnement de l’application. Sans oublié que pour en venir à ce stade les document fonctionnelle et document de conception technique sont indispensables car ils sont les préquels de l’implémentation de l’application.</a:t>
             </a:r>
           </a:p>
         </p:txBody>
@@ -12064,11 +12044,7 @@
             </a:pPr>
             <a:r>
               <a:rPr lang="fr-FR" sz="1600" dirty="0" smtClean="0"/>
-              <a:t>M</a:t>
-            </a:r>
-            <a:r>
-              <a:rPr lang="fr-FR" sz="1600" dirty="0" smtClean="0"/>
-              <a:t>odifier </a:t>
+              <a:t>Modifier </a:t>
             </a:r>
             <a:r>
               <a:rPr lang="fr-FR" sz="1600" dirty="0"/>

</xml_diff>